<commit_message>
some work on the design documents * renamed CrypToolStoreClient to CrypToolStoreUserClient
git-svn-id: https://svn.cryptool.org/CrypTool2/trunk@7569 9b0d660e-8ab2-dd11-ad6d-000c29d71a56
</commit_message>
<xml_diff>
--- a/Documentation/ArchitectureAndDesign/CrypToolStore/CrypToolStoreArchitecture.pptx
+++ b/Documentation/ArchitectureAndDesign/CrypToolStore/CrypToolStoreArchitecture.pptx
@@ -104,6 +104,11 @@
       </a:defRPr>
     </a:lvl9pPr>
   </p:defaultTextStyle>
+  <p:extLst>
+    <p:ext uri="{EFAFB233-063F-42B5-8137-9DF3F51BA10A}">
+      <p15:sldGuideLst xmlns:p15="http://schemas.microsoft.com/office/powerpoint/2012/main"/>
+    </p:ext>
+  </p:extLst>
 </p:presentation>
 </file>
 
@@ -238,7 +243,7 @@
           <a:p>
             <a:fld id="{297C41F3-A638-4333-837B-978125DCA1AC}" type="datetimeFigureOut">
               <a:rPr lang="de-DE" smtClean="0"/>
-              <a:t>24.07.2018</a:t>
+              <a:t>01.08.2018</a:t>
             </a:fld>
             <a:endParaRPr lang="de-DE"/>
           </a:p>
@@ -408,7 +413,7 @@
           <a:p>
             <a:fld id="{297C41F3-A638-4333-837B-978125DCA1AC}" type="datetimeFigureOut">
               <a:rPr lang="de-DE" smtClean="0"/>
-              <a:t>24.07.2018</a:t>
+              <a:t>01.08.2018</a:t>
             </a:fld>
             <a:endParaRPr lang="de-DE"/>
           </a:p>
@@ -588,7 +593,7 @@
           <a:p>
             <a:fld id="{297C41F3-A638-4333-837B-978125DCA1AC}" type="datetimeFigureOut">
               <a:rPr lang="de-DE" smtClean="0"/>
-              <a:t>24.07.2018</a:t>
+              <a:t>01.08.2018</a:t>
             </a:fld>
             <a:endParaRPr lang="de-DE"/>
           </a:p>
@@ -758,7 +763,7 @@
           <a:p>
             <a:fld id="{297C41F3-A638-4333-837B-978125DCA1AC}" type="datetimeFigureOut">
               <a:rPr lang="de-DE" smtClean="0"/>
-              <a:t>24.07.2018</a:t>
+              <a:t>01.08.2018</a:t>
             </a:fld>
             <a:endParaRPr lang="de-DE"/>
           </a:p>
@@ -1004,7 +1009,7 @@
           <a:p>
             <a:fld id="{297C41F3-A638-4333-837B-978125DCA1AC}" type="datetimeFigureOut">
               <a:rPr lang="de-DE" smtClean="0"/>
-              <a:t>24.07.2018</a:t>
+              <a:t>01.08.2018</a:t>
             </a:fld>
             <a:endParaRPr lang="de-DE"/>
           </a:p>
@@ -1236,7 +1241,7 @@
           <a:p>
             <a:fld id="{297C41F3-A638-4333-837B-978125DCA1AC}" type="datetimeFigureOut">
               <a:rPr lang="de-DE" smtClean="0"/>
-              <a:t>24.07.2018</a:t>
+              <a:t>01.08.2018</a:t>
             </a:fld>
             <a:endParaRPr lang="de-DE"/>
           </a:p>
@@ -1603,7 +1608,7 @@
           <a:p>
             <a:fld id="{297C41F3-A638-4333-837B-978125DCA1AC}" type="datetimeFigureOut">
               <a:rPr lang="de-DE" smtClean="0"/>
-              <a:t>24.07.2018</a:t>
+              <a:t>01.08.2018</a:t>
             </a:fld>
             <a:endParaRPr lang="de-DE"/>
           </a:p>
@@ -1721,7 +1726,7 @@
           <a:p>
             <a:fld id="{297C41F3-A638-4333-837B-978125DCA1AC}" type="datetimeFigureOut">
               <a:rPr lang="de-DE" smtClean="0"/>
-              <a:t>24.07.2018</a:t>
+              <a:t>01.08.2018</a:t>
             </a:fld>
             <a:endParaRPr lang="de-DE"/>
           </a:p>
@@ -1816,7 +1821,7 @@
           <a:p>
             <a:fld id="{297C41F3-A638-4333-837B-978125DCA1AC}" type="datetimeFigureOut">
               <a:rPr lang="de-DE" smtClean="0"/>
-              <a:t>24.07.2018</a:t>
+              <a:t>01.08.2018</a:t>
             </a:fld>
             <a:endParaRPr lang="de-DE"/>
           </a:p>
@@ -2093,7 +2098,7 @@
           <a:p>
             <a:fld id="{297C41F3-A638-4333-837B-978125DCA1AC}" type="datetimeFigureOut">
               <a:rPr lang="de-DE" smtClean="0"/>
-              <a:t>24.07.2018</a:t>
+              <a:t>01.08.2018</a:t>
             </a:fld>
             <a:endParaRPr lang="de-DE"/>
           </a:p>
@@ -2346,7 +2351,7 @@
           <a:p>
             <a:fld id="{297C41F3-A638-4333-837B-978125DCA1AC}" type="datetimeFigureOut">
               <a:rPr lang="de-DE" smtClean="0"/>
-              <a:t>24.07.2018</a:t>
+              <a:t>01.08.2018</a:t>
             </a:fld>
             <a:endParaRPr lang="de-DE"/>
           </a:p>
@@ -2559,7 +2564,7 @@
           <a:p>
             <a:fld id="{297C41F3-A638-4333-837B-978125DCA1AC}" type="datetimeFigureOut">
               <a:rPr lang="de-DE" smtClean="0"/>
-              <a:t>24.07.2018</a:t>
+              <a:t>01.08.2018</a:t>
             </a:fld>
             <a:endParaRPr lang="de-DE"/>
           </a:p>
@@ -3429,12 +3434,12 @@
           <a:p>
             <a:pPr algn="ctr"/>
             <a:r>
-              <a:rPr lang="en-US" dirty="0" err="1">
+              <a:rPr lang="en-US" dirty="0" err="1" smtClean="0">
                 <a:solidFill>
                   <a:schemeClr val="tx1"/>
                 </a:solidFill>
               </a:rPr>
-              <a:t>CrypToolStoreClient</a:t>
+              <a:t>CrypToolStoreUserClient</a:t>
             </a:r>
             <a:endParaRPr lang="de-DE" dirty="0">
               <a:solidFill>

</xml_diff>